<commit_message>
chapter 5 done inc cart project
</commit_message>
<xml_diff>
--- a/ROADMAP/roadmap js.pptx
+++ b/ROADMAP/roadmap js.pptx
@@ -266,7 +266,7 @@
           <a:p>
             <a:fld id="{3757B9D6-B1DD-42FC-8CF6-CEEED335747B}" type="datetimeFigureOut">
               <a:rPr lang="en-IN" smtClean="0"/>
-              <a:t>17-11-2025</a:t>
+              <a:t>22-11-2025</a:t>
             </a:fld>
             <a:endParaRPr lang="en-IN"/>
           </a:p>
@@ -466,7 +466,7 @@
           <a:p>
             <a:fld id="{3757B9D6-B1DD-42FC-8CF6-CEEED335747B}" type="datetimeFigureOut">
               <a:rPr lang="en-IN" smtClean="0"/>
-              <a:t>17-11-2025</a:t>
+              <a:t>22-11-2025</a:t>
             </a:fld>
             <a:endParaRPr lang="en-IN"/>
           </a:p>
@@ -676,7 +676,7 @@
           <a:p>
             <a:fld id="{3757B9D6-B1DD-42FC-8CF6-CEEED335747B}" type="datetimeFigureOut">
               <a:rPr lang="en-IN" smtClean="0"/>
-              <a:t>17-11-2025</a:t>
+              <a:t>22-11-2025</a:t>
             </a:fld>
             <a:endParaRPr lang="en-IN"/>
           </a:p>
@@ -876,7 +876,7 @@
           <a:p>
             <a:fld id="{3757B9D6-B1DD-42FC-8CF6-CEEED335747B}" type="datetimeFigureOut">
               <a:rPr lang="en-IN" smtClean="0"/>
-              <a:t>17-11-2025</a:t>
+              <a:t>22-11-2025</a:t>
             </a:fld>
             <a:endParaRPr lang="en-IN"/>
           </a:p>
@@ -1152,7 +1152,7 @@
           <a:p>
             <a:fld id="{3757B9D6-B1DD-42FC-8CF6-CEEED335747B}" type="datetimeFigureOut">
               <a:rPr lang="en-IN" smtClean="0"/>
-              <a:t>17-11-2025</a:t>
+              <a:t>22-11-2025</a:t>
             </a:fld>
             <a:endParaRPr lang="en-IN"/>
           </a:p>
@@ -1420,7 +1420,7 @@
           <a:p>
             <a:fld id="{3757B9D6-B1DD-42FC-8CF6-CEEED335747B}" type="datetimeFigureOut">
               <a:rPr lang="en-IN" smtClean="0"/>
-              <a:t>17-11-2025</a:t>
+              <a:t>22-11-2025</a:t>
             </a:fld>
             <a:endParaRPr lang="en-IN"/>
           </a:p>
@@ -1835,7 +1835,7 @@
           <a:p>
             <a:fld id="{3757B9D6-B1DD-42FC-8CF6-CEEED335747B}" type="datetimeFigureOut">
               <a:rPr lang="en-IN" smtClean="0"/>
-              <a:t>17-11-2025</a:t>
+              <a:t>22-11-2025</a:t>
             </a:fld>
             <a:endParaRPr lang="en-IN"/>
           </a:p>
@@ -1977,7 +1977,7 @@
           <a:p>
             <a:fld id="{3757B9D6-B1DD-42FC-8CF6-CEEED335747B}" type="datetimeFigureOut">
               <a:rPr lang="en-IN" smtClean="0"/>
-              <a:t>17-11-2025</a:t>
+              <a:t>22-11-2025</a:t>
             </a:fld>
             <a:endParaRPr lang="en-IN"/>
           </a:p>
@@ -2090,7 +2090,7 @@
           <a:p>
             <a:fld id="{3757B9D6-B1DD-42FC-8CF6-CEEED335747B}" type="datetimeFigureOut">
               <a:rPr lang="en-IN" smtClean="0"/>
-              <a:t>17-11-2025</a:t>
+              <a:t>22-11-2025</a:t>
             </a:fld>
             <a:endParaRPr lang="en-IN"/>
           </a:p>
@@ -2403,7 +2403,7 @@
           <a:p>
             <a:fld id="{3757B9D6-B1DD-42FC-8CF6-CEEED335747B}" type="datetimeFigureOut">
               <a:rPr lang="en-IN" smtClean="0"/>
-              <a:t>17-11-2025</a:t>
+              <a:t>22-11-2025</a:t>
             </a:fld>
             <a:endParaRPr lang="en-IN"/>
           </a:p>
@@ -2692,7 +2692,7 @@
           <a:p>
             <a:fld id="{3757B9D6-B1DD-42FC-8CF6-CEEED335747B}" type="datetimeFigureOut">
               <a:rPr lang="en-IN" smtClean="0"/>
-              <a:t>17-11-2025</a:t>
+              <a:t>22-11-2025</a:t>
             </a:fld>
             <a:endParaRPr lang="en-IN"/>
           </a:p>
@@ -2935,7 +2935,7 @@
           <a:p>
             <a:fld id="{3757B9D6-B1DD-42FC-8CF6-CEEED335747B}" type="datetimeFigureOut">
               <a:rPr lang="en-IN" smtClean="0"/>
-              <a:t>17-11-2025</a:t>
+              <a:t>22-11-2025</a:t>
             </a:fld>
             <a:endParaRPr lang="en-IN"/>
           </a:p>
@@ -4112,7 +4112,7 @@
             <p:ph idx="1"/>
             <p:extLst>
               <p:ext uri="{D42A27DB-BD31-4B8C-83A1-F6EECF244321}">
-                <p14:modId xmlns:p14="http://schemas.microsoft.com/office/powerpoint/2010/main" val="3850282135"/>
+                <p14:modId xmlns:p14="http://schemas.microsoft.com/office/powerpoint/2010/main" val="2037537697"/>
               </p:ext>
             </p:extLst>
           </p:nvPr>
@@ -4289,12 +4289,21 @@
                     <a:p>
                       <a:pPr algn="ctr" fontAlgn="b"/>
                       <a:r>
-                        <a:rPr lang="en-IN" sz="1400" u="none" strike="noStrike">
-                          <a:effectLst/>
-                        </a:rPr>
-                        <a:t> </a:t>
-                      </a:r>
-                      <a:endParaRPr lang="en-IN" sz="1400" b="0" i="0" u="none" strike="noStrike">
+                        <a:rPr lang="en-IN" sz="1400" u="none" strike="noStrike" dirty="0">
+                          <a:effectLst/>
+                        </a:rPr>
+                        <a:t>DONE</a:t>
+                      </a:r>
+                    </a:p>
+                    <a:p>
+                      <a:pPr algn="ctr" fontAlgn="b"/>
+                      <a:r>
+                        <a:rPr lang="en-IN" sz="1400" u="none" strike="noStrike" dirty="0">
+                          <a:effectLst/>
+                        </a:rPr>
+                        <a:t> </a:t>
+                      </a:r>
+                      <a:endParaRPr lang="en-IN" sz="1400" b="0" i="0" u="none" strike="noStrike" dirty="0">
                         <a:solidFill>
                           <a:srgbClr val="000000"/>
                         </a:solidFill>
@@ -4538,12 +4547,21 @@
                     <a:p>
                       <a:pPr algn="ctr" fontAlgn="b"/>
                       <a:r>
-                        <a:rPr lang="en-IN" sz="1400" u="none" strike="noStrike">
-                          <a:effectLst/>
-                        </a:rPr>
-                        <a:t> </a:t>
-                      </a:r>
-                      <a:endParaRPr lang="en-IN" sz="1400" b="0" i="0" u="none" strike="noStrike">
+                        <a:rPr lang="en-IN" sz="1400" u="none" strike="noStrike" dirty="0">
+                          <a:effectLst/>
+                        </a:rPr>
+                        <a:t>DONE</a:t>
+                      </a:r>
+                    </a:p>
+                    <a:p>
+                      <a:pPr algn="ctr" fontAlgn="b"/>
+                      <a:r>
+                        <a:rPr lang="en-IN" sz="1400" u="none" strike="noStrike" dirty="0">
+                          <a:effectLst/>
+                        </a:rPr>
+                        <a:t> </a:t>
+                      </a:r>
+                      <a:endParaRPr lang="en-IN" sz="1400" b="0" i="0" u="none" strike="noStrike" dirty="0">
                         <a:solidFill>
                           <a:srgbClr val="000000"/>
                         </a:solidFill>
@@ -4752,9 +4770,12 @@
                         <a:rPr lang="en-IN" sz="1400" u="none" strike="noStrike">
                           <a:effectLst/>
                         </a:rPr>
-                        <a:t> </a:t>
-                      </a:r>
-                      <a:endParaRPr lang="en-IN" sz="1400" b="0" i="0" u="none" strike="noStrike">
+                        <a:t> DONE</a:t>
+                      </a:r>
+                    </a:p>
+                    <a:p>
+                      <a:pPr algn="ctr" fontAlgn="b"/>
+                      <a:endParaRPr lang="en-IN" sz="1400" b="0" i="0" u="none" strike="noStrike" dirty="0">
                         <a:solidFill>
                           <a:srgbClr val="000000"/>
                         </a:solidFill>

</xml_diff>

<commit_message>
chapters till 7 completed
</commit_message>
<xml_diff>
--- a/ROADMAP/roadmap js.pptx
+++ b/ROADMAP/roadmap js.pptx
@@ -11,6 +11,9 @@
     <p:sldId id="257" r:id="rId5"/>
     <p:sldId id="260" r:id="rId6"/>
     <p:sldId id="261" r:id="rId7"/>
+    <p:sldId id="262" r:id="rId8"/>
+    <p:sldId id="263" r:id="rId9"/>
+    <p:sldId id="264" r:id="rId10"/>
   </p:sldIdLst>
   <p:sldSz cx="12192000" cy="6858000"/>
   <p:notesSz cx="6858000" cy="9144000"/>
@@ -266,7 +269,7 @@
           <a:p>
             <a:fld id="{3757B9D6-B1DD-42FC-8CF6-CEEED335747B}" type="datetimeFigureOut">
               <a:rPr lang="en-IN" smtClean="0"/>
-              <a:t>22-11-2025</a:t>
+              <a:t>27-11-2025</a:t>
             </a:fld>
             <a:endParaRPr lang="en-IN"/>
           </a:p>
@@ -466,7 +469,7 @@
           <a:p>
             <a:fld id="{3757B9D6-B1DD-42FC-8CF6-CEEED335747B}" type="datetimeFigureOut">
               <a:rPr lang="en-IN" smtClean="0"/>
-              <a:t>22-11-2025</a:t>
+              <a:t>27-11-2025</a:t>
             </a:fld>
             <a:endParaRPr lang="en-IN"/>
           </a:p>
@@ -676,7 +679,7 @@
           <a:p>
             <a:fld id="{3757B9D6-B1DD-42FC-8CF6-CEEED335747B}" type="datetimeFigureOut">
               <a:rPr lang="en-IN" smtClean="0"/>
-              <a:t>22-11-2025</a:t>
+              <a:t>27-11-2025</a:t>
             </a:fld>
             <a:endParaRPr lang="en-IN"/>
           </a:p>
@@ -876,7 +879,7 @@
           <a:p>
             <a:fld id="{3757B9D6-B1DD-42FC-8CF6-CEEED335747B}" type="datetimeFigureOut">
               <a:rPr lang="en-IN" smtClean="0"/>
-              <a:t>22-11-2025</a:t>
+              <a:t>27-11-2025</a:t>
             </a:fld>
             <a:endParaRPr lang="en-IN"/>
           </a:p>
@@ -1152,7 +1155,7 @@
           <a:p>
             <a:fld id="{3757B9D6-B1DD-42FC-8CF6-CEEED335747B}" type="datetimeFigureOut">
               <a:rPr lang="en-IN" smtClean="0"/>
-              <a:t>22-11-2025</a:t>
+              <a:t>27-11-2025</a:t>
             </a:fld>
             <a:endParaRPr lang="en-IN"/>
           </a:p>
@@ -1420,7 +1423,7 @@
           <a:p>
             <a:fld id="{3757B9D6-B1DD-42FC-8CF6-CEEED335747B}" type="datetimeFigureOut">
               <a:rPr lang="en-IN" smtClean="0"/>
-              <a:t>22-11-2025</a:t>
+              <a:t>27-11-2025</a:t>
             </a:fld>
             <a:endParaRPr lang="en-IN"/>
           </a:p>
@@ -1835,7 +1838,7 @@
           <a:p>
             <a:fld id="{3757B9D6-B1DD-42FC-8CF6-CEEED335747B}" type="datetimeFigureOut">
               <a:rPr lang="en-IN" smtClean="0"/>
-              <a:t>22-11-2025</a:t>
+              <a:t>27-11-2025</a:t>
             </a:fld>
             <a:endParaRPr lang="en-IN"/>
           </a:p>
@@ -1977,7 +1980,7 @@
           <a:p>
             <a:fld id="{3757B9D6-B1DD-42FC-8CF6-CEEED335747B}" type="datetimeFigureOut">
               <a:rPr lang="en-IN" smtClean="0"/>
-              <a:t>22-11-2025</a:t>
+              <a:t>27-11-2025</a:t>
             </a:fld>
             <a:endParaRPr lang="en-IN"/>
           </a:p>
@@ -2090,7 +2093,7 @@
           <a:p>
             <a:fld id="{3757B9D6-B1DD-42FC-8CF6-CEEED335747B}" type="datetimeFigureOut">
               <a:rPr lang="en-IN" smtClean="0"/>
-              <a:t>22-11-2025</a:t>
+              <a:t>27-11-2025</a:t>
             </a:fld>
             <a:endParaRPr lang="en-IN"/>
           </a:p>
@@ -2403,7 +2406,7 @@
           <a:p>
             <a:fld id="{3757B9D6-B1DD-42FC-8CF6-CEEED335747B}" type="datetimeFigureOut">
               <a:rPr lang="en-IN" smtClean="0"/>
-              <a:t>22-11-2025</a:t>
+              <a:t>27-11-2025</a:t>
             </a:fld>
             <a:endParaRPr lang="en-IN"/>
           </a:p>
@@ -2692,7 +2695,7 @@
           <a:p>
             <a:fld id="{3757B9D6-B1DD-42FC-8CF6-CEEED335747B}" type="datetimeFigureOut">
               <a:rPr lang="en-IN" smtClean="0"/>
-              <a:t>22-11-2025</a:t>
+              <a:t>27-11-2025</a:t>
             </a:fld>
             <a:endParaRPr lang="en-IN"/>
           </a:p>
@@ -2935,7 +2938,7 @@
           <a:p>
             <a:fld id="{3757B9D6-B1DD-42FC-8CF6-CEEED335747B}" type="datetimeFigureOut">
               <a:rPr lang="en-IN" smtClean="0"/>
-              <a:t>22-11-2025</a:t>
+              <a:t>27-11-2025</a:t>
             </a:fld>
             <a:endParaRPr lang="en-IN"/>
           </a:p>
@@ -4112,7 +4115,7 @@
             <p:ph idx="1"/>
             <p:extLst>
               <p:ext uri="{D42A27DB-BD31-4B8C-83A1-F6EECF244321}">
-                <p14:modId xmlns:p14="http://schemas.microsoft.com/office/powerpoint/2010/main" val="2037537697"/>
+                <p14:modId xmlns:p14="http://schemas.microsoft.com/office/powerpoint/2010/main" val="3954359678"/>
               </p:ext>
             </p:extLst>
           </p:nvPr>
@@ -4981,12 +4984,21 @@
                     <a:p>
                       <a:pPr algn="ctr" fontAlgn="b"/>
                       <a:r>
-                        <a:rPr lang="en-IN" sz="1400" u="none" strike="noStrike">
-                          <a:effectLst/>
-                        </a:rPr>
-                        <a:t> </a:t>
-                      </a:r>
-                      <a:endParaRPr lang="en-IN" sz="1400" b="0" i="0" u="none" strike="noStrike">
+                        <a:rPr lang="en-IN" sz="1400" u="none" strike="noStrike" dirty="0">
+                          <a:effectLst/>
+                        </a:rPr>
+                        <a:t>DONE</a:t>
+                      </a:r>
+                    </a:p>
+                    <a:p>
+                      <a:pPr algn="ctr" fontAlgn="b"/>
+                      <a:r>
+                        <a:rPr lang="en-IN" sz="1400" u="none" strike="noStrike" dirty="0">
+                          <a:effectLst/>
+                        </a:rPr>
+                        <a:t> </a:t>
+                      </a:r>
+                      <a:endParaRPr lang="en-IN" sz="1400" b="0" i="0" u="none" strike="noStrike" dirty="0">
                         <a:solidFill>
                           <a:srgbClr val="000000"/>
                         </a:solidFill>
@@ -5107,12 +5119,12 @@
                     <a:p>
                       <a:pPr algn="l" fontAlgn="b"/>
                       <a:r>
-                        <a:rPr lang="en-IN" sz="1400" u="none" strike="noStrike">
-                          <a:effectLst/>
-                        </a:rPr>
-                        <a:t> </a:t>
-                      </a:r>
-                      <a:endParaRPr lang="en-IN" sz="1400" b="0" i="0" u="none" strike="noStrike">
+                        <a:rPr lang="en-IN" sz="1400" u="none" strike="noStrike" dirty="0">
+                          <a:effectLst/>
+                        </a:rPr>
+                        <a:t> </a:t>
+                      </a:r>
+                      <a:endParaRPr lang="en-IN" sz="1400" b="0" i="0" u="none" strike="noStrike" dirty="0">
                         <a:solidFill>
                           <a:srgbClr val="000000"/>
                         </a:solidFill>
@@ -5192,12 +5204,21 @@
                     <a:p>
                       <a:pPr algn="ctr" fontAlgn="b"/>
                       <a:r>
-                        <a:rPr lang="en-IN" sz="1400" u="none" strike="noStrike">
-                          <a:effectLst/>
-                        </a:rPr>
-                        <a:t> </a:t>
-                      </a:r>
-                      <a:endParaRPr lang="en-IN" sz="1400" b="0" i="0" u="none" strike="noStrike">
+                        <a:rPr lang="en-IN" sz="1400" u="none" strike="noStrike" dirty="0">
+                          <a:effectLst/>
+                        </a:rPr>
+                        <a:t>DONE</a:t>
+                      </a:r>
+                    </a:p>
+                    <a:p>
+                      <a:pPr algn="ctr" fontAlgn="b"/>
+                      <a:r>
+                        <a:rPr lang="en-IN" sz="1400" u="none" strike="noStrike" dirty="0">
+                          <a:effectLst/>
+                        </a:rPr>
+                        <a:t> </a:t>
+                      </a:r>
+                      <a:endParaRPr lang="en-IN" sz="1400" b="0" i="0" u="none" strike="noStrike" dirty="0">
                         <a:solidFill>
                           <a:srgbClr val="000000"/>
                         </a:solidFill>
@@ -5318,12 +5339,12 @@
                     <a:p>
                       <a:pPr algn="l" fontAlgn="b"/>
                       <a:r>
-                        <a:rPr lang="en-IN" sz="1400" u="none" strike="noStrike">
-                          <a:effectLst/>
-                        </a:rPr>
-                        <a:t> </a:t>
-                      </a:r>
-                      <a:endParaRPr lang="en-IN" sz="1400" b="0" i="0" u="none" strike="noStrike">
+                        <a:rPr lang="en-IN" sz="1400" u="none" strike="noStrike" dirty="0">
+                          <a:effectLst/>
+                        </a:rPr>
+                        <a:t> </a:t>
+                      </a:r>
+                      <a:endParaRPr lang="en-IN" sz="1400" b="0" i="0" u="none" strike="noStrike" dirty="0">
                         <a:solidFill>
                           <a:srgbClr val="000000"/>
                         </a:solidFill>
@@ -5406,9 +5427,18 @@
                         <a:rPr lang="en-IN" sz="1400" u="none" strike="noStrike">
                           <a:effectLst/>
                         </a:rPr>
-                        <a:t> </a:t>
-                      </a:r>
-                      <a:endParaRPr lang="en-IN" sz="1400" b="0" i="0" u="none" strike="noStrike">
+                        <a:t>DONE</a:t>
+                      </a:r>
+                    </a:p>
+                    <a:p>
+                      <a:pPr algn="ctr" fontAlgn="b"/>
+                      <a:r>
+                        <a:rPr lang="en-IN" sz="1400" u="none" strike="noStrike">
+                          <a:effectLst/>
+                        </a:rPr>
+                        <a:t> </a:t>
+                      </a:r>
+                      <a:endParaRPr lang="en-IN" sz="1400" b="0" i="0" u="none" strike="noStrike" dirty="0">
                         <a:solidFill>
                           <a:srgbClr val="000000"/>
                         </a:solidFill>
@@ -9475,6 +9505,233 @@
     <p:extLst>
       <p:ext uri="{BB962C8B-B14F-4D97-AF65-F5344CB8AC3E}">
         <p14:creationId xmlns:p14="http://schemas.microsoft.com/office/powerpoint/2010/main" val="4070522685"/>
+      </p:ext>
+    </p:extLst>
+  </p:cSld>
+  <p:clrMapOvr>
+    <a:masterClrMapping/>
+  </p:clrMapOvr>
+</p:sld>
+</file>
+
+<file path=ppt/slides/slide7.xml><?xml version="1.0" encoding="utf-8"?>
+<p:sld xmlns:a="http://schemas.openxmlformats.org/drawingml/2006/main" xmlns:r="http://schemas.openxmlformats.org/officeDocument/2006/relationships" xmlns:p="http://schemas.openxmlformats.org/presentationml/2006/main">
+  <p:cSld>
+    <p:spTree>
+      <p:nvGrpSpPr>
+        <p:cNvPr id="1" name=""/>
+        <p:cNvGrpSpPr/>
+        <p:nvPr/>
+      </p:nvGrpSpPr>
+      <p:grpSpPr>
+        <a:xfrm>
+          <a:off x="0" y="0"/>
+          <a:ext cx="0" cy="0"/>
+          <a:chOff x="0" y="0"/>
+          <a:chExt cx="0" cy="0"/>
+        </a:xfrm>
+      </p:grpSpPr>
+      <p:sp>
+        <p:nvSpPr>
+          <p:cNvPr id="2" name="Title 1">
+            <a:extLst>
+              <a:ext uri="{FF2B5EF4-FFF2-40B4-BE49-F238E27FC236}">
+                <a16:creationId xmlns:a16="http://schemas.microsoft.com/office/drawing/2014/main" id="{A1FF413A-45DF-5CD4-3381-8CBFF0DCA216}"/>
+              </a:ext>
+            </a:extLst>
+          </p:cNvPr>
+          <p:cNvSpPr>
+            <a:spLocks noGrp="1"/>
+          </p:cNvSpPr>
+          <p:nvPr>
+            <p:ph type="title"/>
+          </p:nvPr>
+        </p:nvSpPr>
+        <p:spPr/>
+        <p:txBody>
+          <a:bodyPr/>
+          <a:lstStyle/>
+          <a:p>
+            <a:r>
+              <a:rPr lang="en-IN" dirty="0" err="1"/>
+              <a:t>Practiss</a:t>
+            </a:r>
+            <a:r>
+              <a:rPr lang="en-IN" dirty="0"/>
+              <a:t> the exercises in</a:t>
+            </a:r>
+          </a:p>
+        </p:txBody>
+      </p:sp>
+      <p:pic>
+        <p:nvPicPr>
+          <p:cNvPr id="5" name="Content Placeholder 4">
+            <a:extLst>
+              <a:ext uri="{FF2B5EF4-FFF2-40B4-BE49-F238E27FC236}">
+                <a16:creationId xmlns:a16="http://schemas.microsoft.com/office/drawing/2014/main" id="{C8F2294E-5AC1-5FA3-AC68-9CEFA8EE3D63}"/>
+              </a:ext>
+            </a:extLst>
+          </p:cNvPr>
+          <p:cNvPicPr>
+            <a:picLocks noGrp="1" noChangeAspect="1"/>
+          </p:cNvPicPr>
+          <p:nvPr>
+            <p:ph idx="1"/>
+          </p:nvPr>
+        </p:nvPicPr>
+        <p:blipFill>
+          <a:blip r:embed="rId2">
+            <a:extLst>
+              <a:ext uri="{28A0092B-C50C-407E-A947-70E740481C1C}">
+                <a14:useLocalDpi xmlns:a14="http://schemas.microsoft.com/office/drawing/2010/main" val="0"/>
+              </a:ext>
+            </a:extLst>
+          </a:blip>
+          <a:stretch>
+            <a:fillRect/>
+          </a:stretch>
+        </p:blipFill>
+        <p:spPr>
+          <a:xfrm>
+            <a:off x="2228144" y="1825625"/>
+            <a:ext cx="7735712" cy="4351338"/>
+          </a:xfrm>
+        </p:spPr>
+      </p:pic>
+    </p:spTree>
+    <p:extLst>
+      <p:ext uri="{BB962C8B-B14F-4D97-AF65-F5344CB8AC3E}">
+        <p14:creationId xmlns:p14="http://schemas.microsoft.com/office/powerpoint/2010/main" val="4140449601"/>
+      </p:ext>
+    </p:extLst>
+  </p:cSld>
+  <p:clrMapOvr>
+    <a:masterClrMapping/>
+  </p:clrMapOvr>
+</p:sld>
+</file>
+
+<file path=ppt/slides/slide8.xml><?xml version="1.0" encoding="utf-8"?>
+<p:sld xmlns:a="http://schemas.openxmlformats.org/drawingml/2006/main" xmlns:r="http://schemas.openxmlformats.org/officeDocument/2006/relationships" xmlns:p="http://schemas.openxmlformats.org/presentationml/2006/main">
+  <p:cSld>
+    <p:spTree>
+      <p:nvGrpSpPr>
+        <p:cNvPr id="1" name=""/>
+        <p:cNvGrpSpPr/>
+        <p:nvPr/>
+      </p:nvGrpSpPr>
+      <p:grpSpPr>
+        <a:xfrm>
+          <a:off x="0" y="0"/>
+          <a:ext cx="0" cy="0"/>
+          <a:chOff x="0" y="0"/>
+          <a:chExt cx="0" cy="0"/>
+        </a:xfrm>
+      </p:grpSpPr>
+      <p:pic>
+        <p:nvPicPr>
+          <p:cNvPr id="5" name="Content Placeholder 4">
+            <a:extLst>
+              <a:ext uri="{FF2B5EF4-FFF2-40B4-BE49-F238E27FC236}">
+                <a16:creationId xmlns:a16="http://schemas.microsoft.com/office/drawing/2014/main" id="{C760AE04-9409-AE0A-697C-100B8F608DFB}"/>
+              </a:ext>
+            </a:extLst>
+          </p:cNvPr>
+          <p:cNvPicPr>
+            <a:picLocks noGrp="1" noChangeAspect="1"/>
+          </p:cNvPicPr>
+          <p:nvPr>
+            <p:ph idx="1"/>
+          </p:nvPr>
+        </p:nvPicPr>
+        <p:blipFill>
+          <a:blip r:embed="rId2">
+            <a:extLst>
+              <a:ext uri="{28A0092B-C50C-407E-A947-70E740481C1C}">
+                <a14:useLocalDpi xmlns:a14="http://schemas.microsoft.com/office/drawing/2010/main" val="0"/>
+              </a:ext>
+            </a:extLst>
+          </a:blip>
+          <a:stretch>
+            <a:fillRect/>
+          </a:stretch>
+        </p:blipFill>
+        <p:spPr>
+          <a:xfrm>
+            <a:off x="1631446" y="718458"/>
+            <a:ext cx="9256140" cy="5206579"/>
+          </a:xfrm>
+        </p:spPr>
+      </p:pic>
+    </p:spTree>
+    <p:extLst>
+      <p:ext uri="{BB962C8B-B14F-4D97-AF65-F5344CB8AC3E}">
+        <p14:creationId xmlns:p14="http://schemas.microsoft.com/office/powerpoint/2010/main" val="4240907142"/>
+      </p:ext>
+    </p:extLst>
+  </p:cSld>
+  <p:clrMapOvr>
+    <a:masterClrMapping/>
+  </p:clrMapOvr>
+</p:sld>
+</file>
+
+<file path=ppt/slides/slide9.xml><?xml version="1.0" encoding="utf-8"?>
+<p:sld xmlns:a="http://schemas.openxmlformats.org/drawingml/2006/main" xmlns:r="http://schemas.openxmlformats.org/officeDocument/2006/relationships" xmlns:p="http://schemas.openxmlformats.org/presentationml/2006/main">
+  <p:cSld>
+    <p:spTree>
+      <p:nvGrpSpPr>
+        <p:cNvPr id="1" name=""/>
+        <p:cNvGrpSpPr/>
+        <p:nvPr/>
+      </p:nvGrpSpPr>
+      <p:grpSpPr>
+        <a:xfrm>
+          <a:off x="0" y="0"/>
+          <a:ext cx="0" cy="0"/>
+          <a:chOff x="0" y="0"/>
+          <a:chExt cx="0" cy="0"/>
+        </a:xfrm>
+      </p:grpSpPr>
+      <p:pic>
+        <p:nvPicPr>
+          <p:cNvPr id="5" name="Content Placeholder 4">
+            <a:extLst>
+              <a:ext uri="{FF2B5EF4-FFF2-40B4-BE49-F238E27FC236}">
+                <a16:creationId xmlns:a16="http://schemas.microsoft.com/office/drawing/2014/main" id="{074B1EC6-A9F1-A0BC-F165-E7707567C90E}"/>
+              </a:ext>
+            </a:extLst>
+          </p:cNvPr>
+          <p:cNvPicPr>
+            <a:picLocks noGrp="1" noChangeAspect="1"/>
+          </p:cNvPicPr>
+          <p:nvPr>
+            <p:ph idx="1"/>
+          </p:nvPr>
+        </p:nvPicPr>
+        <p:blipFill>
+          <a:blip r:embed="rId2">
+            <a:extLst>
+              <a:ext uri="{28A0092B-C50C-407E-A947-70E740481C1C}">
+                <a14:useLocalDpi xmlns:a14="http://schemas.microsoft.com/office/drawing/2010/main" val="0"/>
+              </a:ext>
+            </a:extLst>
+          </a:blip>
+          <a:stretch>
+            <a:fillRect/>
+          </a:stretch>
+        </p:blipFill>
+        <p:spPr>
+          <a:xfrm>
+            <a:off x="1429283" y="559837"/>
+            <a:ext cx="9654247" cy="5430514"/>
+          </a:xfrm>
+        </p:spPr>
+      </p:pic>
+    </p:spTree>
+    <p:extLst>
+      <p:ext uri="{BB962C8B-B14F-4D97-AF65-F5344CB8AC3E}">
+        <p14:creationId xmlns:p14="http://schemas.microsoft.com/office/powerpoint/2010/main" val="212224401"/>
       </p:ext>
     </p:extLst>
   </p:cSld>

</xml_diff>

<commit_message>
upto dom half completed
</commit_message>
<xml_diff>
--- a/ROADMAP/roadmap js.pptx
+++ b/ROADMAP/roadmap js.pptx
@@ -269,7 +269,7 @@
           <a:p>
             <a:fld id="{3757B9D6-B1DD-42FC-8CF6-CEEED335747B}" type="datetimeFigureOut">
               <a:rPr lang="en-IN" smtClean="0"/>
-              <a:t>27-11-2025</a:t>
+              <a:t>01-12-2025</a:t>
             </a:fld>
             <a:endParaRPr lang="en-IN"/>
           </a:p>
@@ -469,7 +469,7 @@
           <a:p>
             <a:fld id="{3757B9D6-B1DD-42FC-8CF6-CEEED335747B}" type="datetimeFigureOut">
               <a:rPr lang="en-IN" smtClean="0"/>
-              <a:t>27-11-2025</a:t>
+              <a:t>01-12-2025</a:t>
             </a:fld>
             <a:endParaRPr lang="en-IN"/>
           </a:p>
@@ -679,7 +679,7 @@
           <a:p>
             <a:fld id="{3757B9D6-B1DD-42FC-8CF6-CEEED335747B}" type="datetimeFigureOut">
               <a:rPr lang="en-IN" smtClean="0"/>
-              <a:t>27-11-2025</a:t>
+              <a:t>01-12-2025</a:t>
             </a:fld>
             <a:endParaRPr lang="en-IN"/>
           </a:p>
@@ -879,7 +879,7 @@
           <a:p>
             <a:fld id="{3757B9D6-B1DD-42FC-8CF6-CEEED335747B}" type="datetimeFigureOut">
               <a:rPr lang="en-IN" smtClean="0"/>
-              <a:t>27-11-2025</a:t>
+              <a:t>01-12-2025</a:t>
             </a:fld>
             <a:endParaRPr lang="en-IN"/>
           </a:p>
@@ -1155,7 +1155,7 @@
           <a:p>
             <a:fld id="{3757B9D6-B1DD-42FC-8CF6-CEEED335747B}" type="datetimeFigureOut">
               <a:rPr lang="en-IN" smtClean="0"/>
-              <a:t>27-11-2025</a:t>
+              <a:t>01-12-2025</a:t>
             </a:fld>
             <a:endParaRPr lang="en-IN"/>
           </a:p>
@@ -1423,7 +1423,7 @@
           <a:p>
             <a:fld id="{3757B9D6-B1DD-42FC-8CF6-CEEED335747B}" type="datetimeFigureOut">
               <a:rPr lang="en-IN" smtClean="0"/>
-              <a:t>27-11-2025</a:t>
+              <a:t>01-12-2025</a:t>
             </a:fld>
             <a:endParaRPr lang="en-IN"/>
           </a:p>
@@ -1838,7 +1838,7 @@
           <a:p>
             <a:fld id="{3757B9D6-B1DD-42FC-8CF6-CEEED335747B}" type="datetimeFigureOut">
               <a:rPr lang="en-IN" smtClean="0"/>
-              <a:t>27-11-2025</a:t>
+              <a:t>01-12-2025</a:t>
             </a:fld>
             <a:endParaRPr lang="en-IN"/>
           </a:p>
@@ -1980,7 +1980,7 @@
           <a:p>
             <a:fld id="{3757B9D6-B1DD-42FC-8CF6-CEEED335747B}" type="datetimeFigureOut">
               <a:rPr lang="en-IN" smtClean="0"/>
-              <a:t>27-11-2025</a:t>
+              <a:t>01-12-2025</a:t>
             </a:fld>
             <a:endParaRPr lang="en-IN"/>
           </a:p>
@@ -2093,7 +2093,7 @@
           <a:p>
             <a:fld id="{3757B9D6-B1DD-42FC-8CF6-CEEED335747B}" type="datetimeFigureOut">
               <a:rPr lang="en-IN" smtClean="0"/>
-              <a:t>27-11-2025</a:t>
+              <a:t>01-12-2025</a:t>
             </a:fld>
             <a:endParaRPr lang="en-IN"/>
           </a:p>
@@ -2406,7 +2406,7 @@
           <a:p>
             <a:fld id="{3757B9D6-B1DD-42FC-8CF6-CEEED335747B}" type="datetimeFigureOut">
               <a:rPr lang="en-IN" smtClean="0"/>
-              <a:t>27-11-2025</a:t>
+              <a:t>01-12-2025</a:t>
             </a:fld>
             <a:endParaRPr lang="en-IN"/>
           </a:p>
@@ -2695,7 +2695,7 @@
           <a:p>
             <a:fld id="{3757B9D6-B1DD-42FC-8CF6-CEEED335747B}" type="datetimeFigureOut">
               <a:rPr lang="en-IN" smtClean="0"/>
-              <a:t>27-11-2025</a:t>
+              <a:t>01-12-2025</a:t>
             </a:fld>
             <a:endParaRPr lang="en-IN"/>
           </a:p>
@@ -2938,7 +2938,7 @@
           <a:p>
             <a:fld id="{3757B9D6-B1DD-42FC-8CF6-CEEED335747B}" type="datetimeFigureOut">
               <a:rPr lang="en-IN" smtClean="0"/>
-              <a:t>27-11-2025</a:t>
+              <a:t>01-12-2025</a:t>
             </a:fld>
             <a:endParaRPr lang="en-IN"/>
           </a:p>
@@ -5555,7 +5555,7 @@
             <p:ph idx="1"/>
             <p:extLst>
               <p:ext uri="{D42A27DB-BD31-4B8C-83A1-F6EECF244321}">
-                <p14:modId xmlns:p14="http://schemas.microsoft.com/office/powerpoint/2010/main" val="1838793266"/>
+                <p14:modId xmlns:p14="http://schemas.microsoft.com/office/powerpoint/2010/main" val="3207494595"/>
               </p:ext>
             </p:extLst>
           </p:nvPr>
@@ -5659,6 +5659,15 @@
                         <a:rPr lang="en-IN" sz="1400" u="none" strike="noStrike" dirty="0">
                           <a:effectLst/>
                         </a:rPr>
+                        <a:t>DONE</a:t>
+                      </a:r>
+                    </a:p>
+                    <a:p>
+                      <a:pPr algn="ctr" fontAlgn="b"/>
+                      <a:r>
+                        <a:rPr lang="en-IN" sz="1400" u="none" strike="noStrike" dirty="0">
+                          <a:effectLst/>
+                        </a:rPr>
                         <a:t> </a:t>
                       </a:r>
                       <a:endParaRPr lang="en-IN" sz="1400" b="0" i="0" u="none" strike="noStrike" dirty="0">
@@ -5782,12 +5791,12 @@
                     <a:p>
                       <a:pPr algn="l" fontAlgn="b"/>
                       <a:r>
-                        <a:rPr lang="en-IN" sz="1400" u="none" strike="noStrike">
-                          <a:effectLst/>
-                        </a:rPr>
-                        <a:t> </a:t>
-                      </a:r>
-                      <a:endParaRPr lang="en-IN" sz="1400" b="0" i="0" u="none" strike="noStrike">
+                        <a:rPr lang="en-IN" sz="1400" u="none" strike="noStrike" dirty="0">
+                          <a:effectLst/>
+                        </a:rPr>
+                        <a:t> </a:t>
+                      </a:r>
+                      <a:endParaRPr lang="en-IN" sz="1400" b="0" i="0" u="none" strike="noStrike" dirty="0">
                         <a:solidFill>
                           <a:srgbClr val="000000"/>
                         </a:solidFill>
@@ -5867,12 +5876,12 @@
                     <a:p>
                       <a:pPr algn="ctr" fontAlgn="b"/>
                       <a:r>
-                        <a:rPr lang="en-IN" sz="1400" u="none" strike="noStrike">
-                          <a:effectLst/>
-                        </a:rPr>
-                        <a:t> </a:t>
-                      </a:r>
-                      <a:endParaRPr lang="en-IN" sz="1400" b="0" i="0" u="none" strike="noStrike">
+                        <a:rPr lang="en-IN" sz="1400" u="none" strike="noStrike" dirty="0">
+                          <a:effectLst/>
+                        </a:rPr>
+                        <a:t> </a:t>
+                      </a:r>
+                      <a:endParaRPr lang="en-IN" sz="1400" b="0" i="0" u="none" strike="noStrike" dirty="0">
                         <a:solidFill>
                           <a:srgbClr val="000000"/>
                         </a:solidFill>
@@ -6221,12 +6230,12 @@
                     <a:p>
                       <a:pPr algn="ctr" fontAlgn="b"/>
                       <a:r>
-                        <a:rPr lang="en-IN" sz="1400" u="none" strike="noStrike">
-                          <a:effectLst/>
-                        </a:rPr>
-                        <a:t> </a:t>
-                      </a:r>
-                      <a:endParaRPr lang="en-IN" sz="1400" b="0" i="0" u="none" strike="noStrike">
+                        <a:rPr lang="en-IN" sz="1400" u="none" strike="noStrike" dirty="0">
+                          <a:effectLst/>
+                        </a:rPr>
+                        <a:t> </a:t>
+                      </a:r>
+                      <a:endParaRPr lang="en-IN" sz="1400" b="0" i="0" u="none" strike="noStrike" dirty="0">
                         <a:solidFill>
                           <a:srgbClr val="000000"/>
                         </a:solidFill>

</xml_diff>

<commit_message>
first phase of amazon project done
</commit_message>
<xml_diff>
--- a/ROADMAP/roadmap js.pptx
+++ b/ROADMAP/roadmap js.pptx
@@ -269,7 +269,7 @@
           <a:p>
             <a:fld id="{3757B9D6-B1DD-42FC-8CF6-CEEED335747B}" type="datetimeFigureOut">
               <a:rPr lang="en-IN" smtClean="0"/>
-              <a:t>09-12-2025</a:t>
+              <a:t>11-12-2025</a:t>
             </a:fld>
             <a:endParaRPr lang="en-IN"/>
           </a:p>
@@ -469,7 +469,7 @@
           <a:p>
             <a:fld id="{3757B9D6-B1DD-42FC-8CF6-CEEED335747B}" type="datetimeFigureOut">
               <a:rPr lang="en-IN" smtClean="0"/>
-              <a:t>09-12-2025</a:t>
+              <a:t>11-12-2025</a:t>
             </a:fld>
             <a:endParaRPr lang="en-IN"/>
           </a:p>
@@ -679,7 +679,7 @@
           <a:p>
             <a:fld id="{3757B9D6-B1DD-42FC-8CF6-CEEED335747B}" type="datetimeFigureOut">
               <a:rPr lang="en-IN" smtClean="0"/>
-              <a:t>09-12-2025</a:t>
+              <a:t>11-12-2025</a:t>
             </a:fld>
             <a:endParaRPr lang="en-IN"/>
           </a:p>
@@ -879,7 +879,7 @@
           <a:p>
             <a:fld id="{3757B9D6-B1DD-42FC-8CF6-CEEED335747B}" type="datetimeFigureOut">
               <a:rPr lang="en-IN" smtClean="0"/>
-              <a:t>09-12-2025</a:t>
+              <a:t>11-12-2025</a:t>
             </a:fld>
             <a:endParaRPr lang="en-IN"/>
           </a:p>
@@ -1155,7 +1155,7 @@
           <a:p>
             <a:fld id="{3757B9D6-B1DD-42FC-8CF6-CEEED335747B}" type="datetimeFigureOut">
               <a:rPr lang="en-IN" smtClean="0"/>
-              <a:t>09-12-2025</a:t>
+              <a:t>11-12-2025</a:t>
             </a:fld>
             <a:endParaRPr lang="en-IN"/>
           </a:p>
@@ -1423,7 +1423,7 @@
           <a:p>
             <a:fld id="{3757B9D6-B1DD-42FC-8CF6-CEEED335747B}" type="datetimeFigureOut">
               <a:rPr lang="en-IN" smtClean="0"/>
-              <a:t>09-12-2025</a:t>
+              <a:t>11-12-2025</a:t>
             </a:fld>
             <a:endParaRPr lang="en-IN"/>
           </a:p>
@@ -1838,7 +1838,7 @@
           <a:p>
             <a:fld id="{3757B9D6-B1DD-42FC-8CF6-CEEED335747B}" type="datetimeFigureOut">
               <a:rPr lang="en-IN" smtClean="0"/>
-              <a:t>09-12-2025</a:t>
+              <a:t>11-12-2025</a:t>
             </a:fld>
             <a:endParaRPr lang="en-IN"/>
           </a:p>
@@ -1980,7 +1980,7 @@
           <a:p>
             <a:fld id="{3757B9D6-B1DD-42FC-8CF6-CEEED335747B}" type="datetimeFigureOut">
               <a:rPr lang="en-IN" smtClean="0"/>
-              <a:t>09-12-2025</a:t>
+              <a:t>11-12-2025</a:t>
             </a:fld>
             <a:endParaRPr lang="en-IN"/>
           </a:p>
@@ -2093,7 +2093,7 @@
           <a:p>
             <a:fld id="{3757B9D6-B1DD-42FC-8CF6-CEEED335747B}" type="datetimeFigureOut">
               <a:rPr lang="en-IN" smtClean="0"/>
-              <a:t>09-12-2025</a:t>
+              <a:t>11-12-2025</a:t>
             </a:fld>
             <a:endParaRPr lang="en-IN"/>
           </a:p>
@@ -2406,7 +2406,7 @@
           <a:p>
             <a:fld id="{3757B9D6-B1DD-42FC-8CF6-CEEED335747B}" type="datetimeFigureOut">
               <a:rPr lang="en-IN" smtClean="0"/>
-              <a:t>09-12-2025</a:t>
+              <a:t>11-12-2025</a:t>
             </a:fld>
             <a:endParaRPr lang="en-IN"/>
           </a:p>
@@ -2695,7 +2695,7 @@
           <a:p>
             <a:fld id="{3757B9D6-B1DD-42FC-8CF6-CEEED335747B}" type="datetimeFigureOut">
               <a:rPr lang="en-IN" smtClean="0"/>
-              <a:t>09-12-2025</a:t>
+              <a:t>11-12-2025</a:t>
             </a:fld>
             <a:endParaRPr lang="en-IN"/>
           </a:p>
@@ -2938,7 +2938,7 @@
           <a:p>
             <a:fld id="{3757B9D6-B1DD-42FC-8CF6-CEEED335747B}" type="datetimeFigureOut">
               <a:rPr lang="en-IN" smtClean="0"/>
-              <a:t>09-12-2025</a:t>
+              <a:t>11-12-2025</a:t>
             </a:fld>
             <a:endParaRPr lang="en-IN"/>
           </a:p>
@@ -5555,7 +5555,7 @@
             <p:ph idx="1"/>
             <p:extLst>
               <p:ext uri="{D42A27DB-BD31-4B8C-83A1-F6EECF244321}">
-                <p14:modId xmlns:p14="http://schemas.microsoft.com/office/powerpoint/2010/main" val="4188231267"/>
+                <p14:modId xmlns:p14="http://schemas.microsoft.com/office/powerpoint/2010/main" val="1659086465"/>
               </p:ext>
             </p:extLst>
           </p:nvPr>
@@ -6884,6 +6884,15 @@
                         <a:rPr lang="en-IN" sz="1400" u="none" strike="noStrike" dirty="0">
                           <a:effectLst/>
                         </a:rPr>
+                        <a:t>DONE</a:t>
+                      </a:r>
+                    </a:p>
+                    <a:p>
+                      <a:pPr algn="ctr" fontAlgn="b"/>
+                      <a:r>
+                        <a:rPr lang="en-IN" sz="1400" u="none" strike="noStrike" dirty="0">
+                          <a:effectLst/>
+                        </a:rPr>
                         <a:t> </a:t>
                       </a:r>
                       <a:endParaRPr lang="en-IN" sz="1400" b="0" i="0" u="none" strike="noStrike" dirty="0">
@@ -7007,12 +7016,12 @@
                     <a:p>
                       <a:pPr algn="l" fontAlgn="b"/>
                       <a:r>
-                        <a:rPr lang="en-IN" sz="1400" u="none" strike="noStrike">
-                          <a:effectLst/>
-                        </a:rPr>
-                        <a:t> </a:t>
-                      </a:r>
-                      <a:endParaRPr lang="en-IN" sz="1400" b="0" i="0" u="none" strike="noStrike">
+                        <a:rPr lang="en-IN" sz="1400" u="none" strike="noStrike" dirty="0">
+                          <a:effectLst/>
+                        </a:rPr>
+                        <a:t> </a:t>
+                      </a:r>
+                      <a:endParaRPr lang="en-IN" sz="1400" b="0" i="0" u="none" strike="noStrike" dirty="0">
                         <a:solidFill>
                           <a:srgbClr val="000000"/>
                         </a:solidFill>

</xml_diff>

<commit_message>
amazon project upto ext lib done
</commit_message>
<xml_diff>
--- a/ROADMAP/roadmap js.pptx
+++ b/ROADMAP/roadmap js.pptx
@@ -269,7 +269,7 @@
           <a:p>
             <a:fld id="{3757B9D6-B1DD-42FC-8CF6-CEEED335747B}" type="datetimeFigureOut">
               <a:rPr lang="en-IN" smtClean="0"/>
-              <a:t>11-12-2025</a:t>
+              <a:t>17-12-2025</a:t>
             </a:fld>
             <a:endParaRPr lang="en-IN"/>
           </a:p>
@@ -469,7 +469,7 @@
           <a:p>
             <a:fld id="{3757B9D6-B1DD-42FC-8CF6-CEEED335747B}" type="datetimeFigureOut">
               <a:rPr lang="en-IN" smtClean="0"/>
-              <a:t>11-12-2025</a:t>
+              <a:t>17-12-2025</a:t>
             </a:fld>
             <a:endParaRPr lang="en-IN"/>
           </a:p>
@@ -679,7 +679,7 @@
           <a:p>
             <a:fld id="{3757B9D6-B1DD-42FC-8CF6-CEEED335747B}" type="datetimeFigureOut">
               <a:rPr lang="en-IN" smtClean="0"/>
-              <a:t>11-12-2025</a:t>
+              <a:t>17-12-2025</a:t>
             </a:fld>
             <a:endParaRPr lang="en-IN"/>
           </a:p>
@@ -879,7 +879,7 @@
           <a:p>
             <a:fld id="{3757B9D6-B1DD-42FC-8CF6-CEEED335747B}" type="datetimeFigureOut">
               <a:rPr lang="en-IN" smtClean="0"/>
-              <a:t>11-12-2025</a:t>
+              <a:t>17-12-2025</a:t>
             </a:fld>
             <a:endParaRPr lang="en-IN"/>
           </a:p>
@@ -1155,7 +1155,7 @@
           <a:p>
             <a:fld id="{3757B9D6-B1DD-42FC-8CF6-CEEED335747B}" type="datetimeFigureOut">
               <a:rPr lang="en-IN" smtClean="0"/>
-              <a:t>11-12-2025</a:t>
+              <a:t>17-12-2025</a:t>
             </a:fld>
             <a:endParaRPr lang="en-IN"/>
           </a:p>
@@ -1423,7 +1423,7 @@
           <a:p>
             <a:fld id="{3757B9D6-B1DD-42FC-8CF6-CEEED335747B}" type="datetimeFigureOut">
               <a:rPr lang="en-IN" smtClean="0"/>
-              <a:t>11-12-2025</a:t>
+              <a:t>17-12-2025</a:t>
             </a:fld>
             <a:endParaRPr lang="en-IN"/>
           </a:p>
@@ -1838,7 +1838,7 @@
           <a:p>
             <a:fld id="{3757B9D6-B1DD-42FC-8CF6-CEEED335747B}" type="datetimeFigureOut">
               <a:rPr lang="en-IN" smtClean="0"/>
-              <a:t>11-12-2025</a:t>
+              <a:t>17-12-2025</a:t>
             </a:fld>
             <a:endParaRPr lang="en-IN"/>
           </a:p>
@@ -1980,7 +1980,7 @@
           <a:p>
             <a:fld id="{3757B9D6-B1DD-42FC-8CF6-CEEED335747B}" type="datetimeFigureOut">
               <a:rPr lang="en-IN" smtClean="0"/>
-              <a:t>11-12-2025</a:t>
+              <a:t>17-12-2025</a:t>
             </a:fld>
             <a:endParaRPr lang="en-IN"/>
           </a:p>
@@ -2093,7 +2093,7 @@
           <a:p>
             <a:fld id="{3757B9D6-B1DD-42FC-8CF6-CEEED335747B}" type="datetimeFigureOut">
               <a:rPr lang="en-IN" smtClean="0"/>
-              <a:t>11-12-2025</a:t>
+              <a:t>17-12-2025</a:t>
             </a:fld>
             <a:endParaRPr lang="en-IN"/>
           </a:p>
@@ -2406,7 +2406,7 @@
           <a:p>
             <a:fld id="{3757B9D6-B1DD-42FC-8CF6-CEEED335747B}" type="datetimeFigureOut">
               <a:rPr lang="en-IN" smtClean="0"/>
-              <a:t>11-12-2025</a:t>
+              <a:t>17-12-2025</a:t>
             </a:fld>
             <a:endParaRPr lang="en-IN"/>
           </a:p>
@@ -2695,7 +2695,7 @@
           <a:p>
             <a:fld id="{3757B9D6-B1DD-42FC-8CF6-CEEED335747B}" type="datetimeFigureOut">
               <a:rPr lang="en-IN" smtClean="0"/>
-              <a:t>11-12-2025</a:t>
+              <a:t>17-12-2025</a:t>
             </a:fld>
             <a:endParaRPr lang="en-IN"/>
           </a:p>
@@ -2938,7 +2938,7 @@
           <a:p>
             <a:fld id="{3757B9D6-B1DD-42FC-8CF6-CEEED335747B}" type="datetimeFigureOut">
               <a:rPr lang="en-IN" smtClean="0"/>
-              <a:t>11-12-2025</a:t>
+              <a:t>17-12-2025</a:t>
             </a:fld>
             <a:endParaRPr lang="en-IN"/>
           </a:p>
@@ -5555,7 +5555,7 @@
             <p:ph idx="1"/>
             <p:extLst>
               <p:ext uri="{D42A27DB-BD31-4B8C-83A1-F6EECF244321}">
-                <p14:modId xmlns:p14="http://schemas.microsoft.com/office/powerpoint/2010/main" val="1659086465"/>
+                <p14:modId xmlns:p14="http://schemas.microsoft.com/office/powerpoint/2010/main" val="3690018470"/>
               </p:ext>
             </p:extLst>
           </p:nvPr>
@@ -7092,12 +7092,12 @@
                     <a:p>
                       <a:pPr algn="l" fontAlgn="b"/>
                       <a:r>
-                        <a:rPr lang="en-IN" sz="1400" u="none" strike="noStrike">
-                          <a:effectLst/>
-                        </a:rPr>
-                        <a:t> </a:t>
-                      </a:r>
-                      <a:endParaRPr lang="en-IN" sz="1400" b="0" i="0" u="none" strike="noStrike">
+                        <a:rPr lang="en-IN" sz="1400" u="none" strike="noStrike" dirty="0">
+                          <a:effectLst/>
+                        </a:rPr>
+                        <a:t>              DONE</a:t>
+                      </a:r>
+                      <a:endParaRPr lang="en-IN" sz="1400" b="0" i="0" u="none" strike="noStrike" dirty="0">
                         <a:solidFill>
                           <a:srgbClr val="000000"/>
                         </a:solidFill>
@@ -7122,12 +7122,12 @@
                     <a:p>
                       <a:pPr algn="l" fontAlgn="b"/>
                       <a:r>
-                        <a:rPr lang="en-IN" sz="1400" u="none" strike="noStrike">
-                          <a:effectLst/>
-                        </a:rPr>
-                        <a:t> </a:t>
-                      </a:r>
-                      <a:endParaRPr lang="en-IN" sz="1400" b="0" i="0" u="none" strike="noStrike">
+                        <a:rPr lang="en-IN" sz="1400" u="none" strike="noStrike" dirty="0">
+                          <a:effectLst/>
+                        </a:rPr>
+                        <a:t> </a:t>
+                      </a:r>
+                      <a:endParaRPr lang="en-IN" sz="1400" b="0" i="0" u="none" strike="noStrike" dirty="0">
                         <a:solidFill>
                           <a:srgbClr val="000000"/>
                         </a:solidFill>
@@ -7247,9 +7247,12 @@
                         <a:rPr lang="en-IN" sz="1400" u="none" strike="noStrike">
                           <a:effectLst/>
                         </a:rPr>
-                        <a:t> </a:t>
-                      </a:r>
-                      <a:endParaRPr lang="en-IN" sz="1400" b="0" i="0" u="none" strike="noStrike">
+                        <a:t> DONE</a:t>
+                      </a:r>
+                    </a:p>
+                    <a:p>
+                      <a:pPr algn="ctr" fontAlgn="b"/>
+                      <a:endParaRPr lang="en-IN" sz="1400" b="0" i="0" u="none" strike="noStrike" dirty="0">
                         <a:solidFill>
                           <a:srgbClr val="000000"/>
                         </a:solidFill>
@@ -7366,7 +7369,7 @@
             <p:ph idx="1"/>
             <p:extLst>
               <p:ext uri="{D42A27DB-BD31-4B8C-83A1-F6EECF244321}">
-                <p14:modId xmlns:p14="http://schemas.microsoft.com/office/powerpoint/2010/main" val="480239281"/>
+                <p14:modId xmlns:p14="http://schemas.microsoft.com/office/powerpoint/2010/main" val="1511884905"/>
               </p:ext>
             </p:extLst>
           </p:nvPr>
@@ -7461,9 +7464,9 @@
                         <a:rPr lang="en-IN" sz="1400" u="none" strike="noStrike">
                           <a:effectLst/>
                         </a:rPr>
-                        <a:t> </a:t>
-                      </a:r>
-                      <a:endParaRPr lang="en-IN" sz="1400" b="0" i="0" u="none" strike="noStrike">
+                        <a:t>           DONE</a:t>
+                      </a:r>
+                      <a:endParaRPr lang="en-IN" sz="1400" b="0" i="0" u="none" strike="noStrike" dirty="0">
                         <a:solidFill>
                           <a:srgbClr val="000000"/>
                         </a:solidFill>
@@ -7534,12 +7537,12 @@
                     <a:p>
                       <a:pPr algn="l" fontAlgn="b"/>
                       <a:r>
-                        <a:rPr lang="en-IN" sz="1400" u="none" strike="noStrike">
-                          <a:effectLst/>
-                        </a:rPr>
-                        <a:t> </a:t>
-                      </a:r>
-                      <a:endParaRPr lang="en-IN" sz="1400" b="0" i="0" u="none" strike="noStrike">
+                        <a:rPr lang="en-IN" sz="1400" u="none" strike="noStrike" dirty="0">
+                          <a:effectLst/>
+                        </a:rPr>
+                        <a:t> </a:t>
+                      </a:r>
+                      <a:endParaRPr lang="en-IN" sz="1400" b="0" i="0" u="none" strike="noStrike" dirty="0">
                         <a:solidFill>
                           <a:srgbClr val="000000"/>
                         </a:solidFill>
@@ -7610,12 +7613,21 @@
                     <a:p>
                       <a:pPr algn="ctr" fontAlgn="b"/>
                       <a:r>
-                        <a:rPr lang="en-IN" sz="1400" u="none" strike="noStrike">
-                          <a:effectLst/>
-                        </a:rPr>
-                        <a:t> </a:t>
-                      </a:r>
-                      <a:endParaRPr lang="en-IN" sz="1400" b="0" i="0" u="none" strike="noStrike">
+                        <a:rPr lang="en-IN" sz="1400" u="none" strike="noStrike" dirty="0">
+                          <a:effectLst/>
+                        </a:rPr>
+                        <a:t>DONE</a:t>
+                      </a:r>
+                    </a:p>
+                    <a:p>
+                      <a:pPr algn="ctr" fontAlgn="b"/>
+                      <a:r>
+                        <a:rPr lang="en-IN" sz="1400" u="none" strike="noStrike" dirty="0">
+                          <a:effectLst/>
+                        </a:rPr>
+                        <a:t> </a:t>
+                      </a:r>
+                      <a:endParaRPr lang="en-IN" sz="1400" b="0" i="0" u="none" strike="noStrike" dirty="0">
                         <a:solidFill>
                           <a:srgbClr val="000000"/>
                         </a:solidFill>
@@ -7812,12 +7824,12 @@
                     <a:p>
                       <a:pPr algn="l" fontAlgn="b"/>
                       <a:r>
-                        <a:rPr lang="en-IN" sz="1400" u="none" strike="noStrike">
-                          <a:effectLst/>
-                        </a:rPr>
-                        <a:t> </a:t>
-                      </a:r>
-                      <a:endParaRPr lang="en-IN" sz="1400" b="0" i="0" u="none" strike="noStrike">
+                        <a:rPr lang="en-IN" sz="1400" u="none" strike="noStrike" dirty="0">
+                          <a:effectLst/>
+                        </a:rPr>
+                        <a:t> </a:t>
+                      </a:r>
+                      <a:endParaRPr lang="en-IN" sz="1400" b="0" i="0" u="none" strike="noStrike" dirty="0">
                         <a:solidFill>
                           <a:srgbClr val="000000"/>
                         </a:solidFill>

</xml_diff>

<commit_message>
created class version of cart
</commit_message>
<xml_diff>
--- a/ROADMAP/roadmap js.pptx
+++ b/ROADMAP/roadmap js.pptx
@@ -269,7 +269,7 @@
           <a:p>
             <a:fld id="{3757B9D6-B1DD-42FC-8CF6-CEEED335747B}" type="datetimeFigureOut">
               <a:rPr lang="en-IN" smtClean="0"/>
-              <a:t>27-12-2025</a:t>
+              <a:t>30-12-2025</a:t>
             </a:fld>
             <a:endParaRPr lang="en-IN"/>
           </a:p>
@@ -469,7 +469,7 @@
           <a:p>
             <a:fld id="{3757B9D6-B1DD-42FC-8CF6-CEEED335747B}" type="datetimeFigureOut">
               <a:rPr lang="en-IN" smtClean="0"/>
-              <a:t>27-12-2025</a:t>
+              <a:t>30-12-2025</a:t>
             </a:fld>
             <a:endParaRPr lang="en-IN"/>
           </a:p>
@@ -679,7 +679,7 @@
           <a:p>
             <a:fld id="{3757B9D6-B1DD-42FC-8CF6-CEEED335747B}" type="datetimeFigureOut">
               <a:rPr lang="en-IN" smtClean="0"/>
-              <a:t>27-12-2025</a:t>
+              <a:t>30-12-2025</a:t>
             </a:fld>
             <a:endParaRPr lang="en-IN"/>
           </a:p>
@@ -879,7 +879,7 @@
           <a:p>
             <a:fld id="{3757B9D6-B1DD-42FC-8CF6-CEEED335747B}" type="datetimeFigureOut">
               <a:rPr lang="en-IN" smtClean="0"/>
-              <a:t>27-12-2025</a:t>
+              <a:t>30-12-2025</a:t>
             </a:fld>
             <a:endParaRPr lang="en-IN"/>
           </a:p>
@@ -1155,7 +1155,7 @@
           <a:p>
             <a:fld id="{3757B9D6-B1DD-42FC-8CF6-CEEED335747B}" type="datetimeFigureOut">
               <a:rPr lang="en-IN" smtClean="0"/>
-              <a:t>27-12-2025</a:t>
+              <a:t>30-12-2025</a:t>
             </a:fld>
             <a:endParaRPr lang="en-IN"/>
           </a:p>
@@ -1423,7 +1423,7 @@
           <a:p>
             <a:fld id="{3757B9D6-B1DD-42FC-8CF6-CEEED335747B}" type="datetimeFigureOut">
               <a:rPr lang="en-IN" smtClean="0"/>
-              <a:t>27-12-2025</a:t>
+              <a:t>30-12-2025</a:t>
             </a:fld>
             <a:endParaRPr lang="en-IN"/>
           </a:p>
@@ -1838,7 +1838,7 @@
           <a:p>
             <a:fld id="{3757B9D6-B1DD-42FC-8CF6-CEEED335747B}" type="datetimeFigureOut">
               <a:rPr lang="en-IN" smtClean="0"/>
-              <a:t>27-12-2025</a:t>
+              <a:t>30-12-2025</a:t>
             </a:fld>
             <a:endParaRPr lang="en-IN"/>
           </a:p>
@@ -1980,7 +1980,7 @@
           <a:p>
             <a:fld id="{3757B9D6-B1DD-42FC-8CF6-CEEED335747B}" type="datetimeFigureOut">
               <a:rPr lang="en-IN" smtClean="0"/>
-              <a:t>27-12-2025</a:t>
+              <a:t>30-12-2025</a:t>
             </a:fld>
             <a:endParaRPr lang="en-IN"/>
           </a:p>
@@ -2093,7 +2093,7 @@
           <a:p>
             <a:fld id="{3757B9D6-B1DD-42FC-8CF6-CEEED335747B}" type="datetimeFigureOut">
               <a:rPr lang="en-IN" smtClean="0"/>
-              <a:t>27-12-2025</a:t>
+              <a:t>30-12-2025</a:t>
             </a:fld>
             <a:endParaRPr lang="en-IN"/>
           </a:p>
@@ -2406,7 +2406,7 @@
           <a:p>
             <a:fld id="{3757B9D6-B1DD-42FC-8CF6-CEEED335747B}" type="datetimeFigureOut">
               <a:rPr lang="en-IN" smtClean="0"/>
-              <a:t>27-12-2025</a:t>
+              <a:t>30-12-2025</a:t>
             </a:fld>
             <a:endParaRPr lang="en-IN"/>
           </a:p>
@@ -2695,7 +2695,7 @@
           <a:p>
             <a:fld id="{3757B9D6-B1DD-42FC-8CF6-CEEED335747B}" type="datetimeFigureOut">
               <a:rPr lang="en-IN" smtClean="0"/>
-              <a:t>27-12-2025</a:t>
+              <a:t>30-12-2025</a:t>
             </a:fld>
             <a:endParaRPr lang="en-IN"/>
           </a:p>
@@ -2938,7 +2938,7 @@
           <a:p>
             <a:fld id="{3757B9D6-B1DD-42FC-8CF6-CEEED335747B}" type="datetimeFigureOut">
               <a:rPr lang="en-IN" smtClean="0"/>
-              <a:t>27-12-2025</a:t>
+              <a:t>30-12-2025</a:t>
             </a:fld>
             <a:endParaRPr lang="en-IN"/>
           </a:p>
@@ -7369,7 +7369,7 @@
             <p:ph idx="1"/>
             <p:extLst>
               <p:ext uri="{D42A27DB-BD31-4B8C-83A1-F6EECF244321}">
-                <p14:modId xmlns:p14="http://schemas.microsoft.com/office/powerpoint/2010/main" val="1000236232"/>
+                <p14:modId xmlns:p14="http://schemas.microsoft.com/office/powerpoint/2010/main" val="3822894350"/>
               </p:ext>
             </p:extLst>
           </p:nvPr>
@@ -8181,7 +8181,7 @@
                         <a:rPr lang="en-IN" sz="1400" u="none" strike="noStrike" dirty="0">
                           <a:effectLst/>
                         </a:rPr>
-                        <a:t> </a:t>
+                        <a:t> DONE</a:t>
                       </a:r>
                       <a:endParaRPr lang="en-IN" sz="1400" b="0" i="0" u="none" strike="noStrike" dirty="0">
                         <a:solidFill>
@@ -8333,7 +8333,7 @@
                         <a:rPr lang="en-IN" sz="1400" u="none" strike="noStrike" dirty="0">
                           <a:effectLst/>
                         </a:rPr>
-                        <a:t> </a:t>
+                        <a:t>             DONE</a:t>
                       </a:r>
                       <a:endParaRPr lang="en-IN" sz="1400" b="0" i="0" u="none" strike="noStrike" dirty="0">
                         <a:solidFill>
@@ -8360,12 +8360,12 @@
                     <a:p>
                       <a:pPr algn="l" fontAlgn="b"/>
                       <a:r>
-                        <a:rPr lang="en-IN" sz="1400" u="none" strike="noStrike">
-                          <a:effectLst/>
-                        </a:rPr>
-                        <a:t> </a:t>
-                      </a:r>
-                      <a:endParaRPr lang="en-IN" sz="1400" b="0" i="0" u="none" strike="noStrike">
+                        <a:rPr lang="en-IN" sz="1400" u="none" strike="noStrike" dirty="0">
+                          <a:effectLst/>
+                        </a:rPr>
+                        <a:t> </a:t>
+                      </a:r>
+                      <a:endParaRPr lang="en-IN" sz="1400" b="0" i="0" u="none" strike="noStrike" dirty="0">
                         <a:solidFill>
                           <a:srgbClr val="000000"/>
                         </a:solidFill>
@@ -8488,12 +8488,12 @@
                     <a:p>
                       <a:pPr algn="l" fontAlgn="b"/>
                       <a:r>
-                        <a:rPr lang="en-IN" sz="1400" u="none" strike="noStrike">
-                          <a:effectLst/>
-                        </a:rPr>
-                        <a:t> </a:t>
-                      </a:r>
-                      <a:endParaRPr lang="en-IN" sz="1400" b="0" i="0" u="none" strike="noStrike">
+                        <a:rPr lang="en-IN" sz="1400" u="none" strike="noStrike" dirty="0">
+                          <a:effectLst/>
+                        </a:rPr>
+                        <a:t>             DONE</a:t>
+                      </a:r>
+                      <a:endParaRPr lang="en-IN" sz="1400" b="0" i="0" u="none" strike="noStrike" dirty="0">
                         <a:solidFill>
                           <a:srgbClr val="000000"/>
                         </a:solidFill>
@@ -8594,12 +8594,12 @@
                     <a:p>
                       <a:pPr algn="l" fontAlgn="b"/>
                       <a:r>
-                        <a:rPr lang="en-IN" sz="1400" u="none" strike="noStrike">
+                        <a:rPr lang="en-IN" sz="1400" u="none" strike="noStrike" dirty="0">
                           <a:effectLst/>
                         </a:rPr>
                         <a:t>Classes  </a:t>
                       </a:r>
-                      <a:endParaRPr lang="en-IN" sz="1400" b="0" i="0" u="none" strike="noStrike">
+                      <a:endParaRPr lang="en-IN" sz="1400" b="0" i="0" u="none" strike="noStrike" dirty="0">
                         <a:solidFill>
                           <a:srgbClr val="000000"/>
                         </a:solidFill>

</xml_diff>

<commit_message>
converted products into objects
</commit_message>
<xml_diff>
--- a/ROADMAP/roadmap js.pptx
+++ b/ROADMAP/roadmap js.pptx
@@ -269,7 +269,7 @@
           <a:p>
             <a:fld id="{3757B9D6-B1DD-42FC-8CF6-CEEED335747B}" type="datetimeFigureOut">
               <a:rPr lang="en-IN" smtClean="0"/>
-              <a:t>30-12-2025</a:t>
+              <a:t>01-01-2026</a:t>
             </a:fld>
             <a:endParaRPr lang="en-IN"/>
           </a:p>
@@ -469,7 +469,7 @@
           <a:p>
             <a:fld id="{3757B9D6-B1DD-42FC-8CF6-CEEED335747B}" type="datetimeFigureOut">
               <a:rPr lang="en-IN" smtClean="0"/>
-              <a:t>30-12-2025</a:t>
+              <a:t>01-01-2026</a:t>
             </a:fld>
             <a:endParaRPr lang="en-IN"/>
           </a:p>
@@ -679,7 +679,7 @@
           <a:p>
             <a:fld id="{3757B9D6-B1DD-42FC-8CF6-CEEED335747B}" type="datetimeFigureOut">
               <a:rPr lang="en-IN" smtClean="0"/>
-              <a:t>30-12-2025</a:t>
+              <a:t>01-01-2026</a:t>
             </a:fld>
             <a:endParaRPr lang="en-IN"/>
           </a:p>
@@ -879,7 +879,7 @@
           <a:p>
             <a:fld id="{3757B9D6-B1DD-42FC-8CF6-CEEED335747B}" type="datetimeFigureOut">
               <a:rPr lang="en-IN" smtClean="0"/>
-              <a:t>30-12-2025</a:t>
+              <a:t>01-01-2026</a:t>
             </a:fld>
             <a:endParaRPr lang="en-IN"/>
           </a:p>
@@ -1155,7 +1155,7 @@
           <a:p>
             <a:fld id="{3757B9D6-B1DD-42FC-8CF6-CEEED335747B}" type="datetimeFigureOut">
               <a:rPr lang="en-IN" smtClean="0"/>
-              <a:t>30-12-2025</a:t>
+              <a:t>01-01-2026</a:t>
             </a:fld>
             <a:endParaRPr lang="en-IN"/>
           </a:p>
@@ -1423,7 +1423,7 @@
           <a:p>
             <a:fld id="{3757B9D6-B1DD-42FC-8CF6-CEEED335747B}" type="datetimeFigureOut">
               <a:rPr lang="en-IN" smtClean="0"/>
-              <a:t>30-12-2025</a:t>
+              <a:t>01-01-2026</a:t>
             </a:fld>
             <a:endParaRPr lang="en-IN"/>
           </a:p>
@@ -1838,7 +1838,7 @@
           <a:p>
             <a:fld id="{3757B9D6-B1DD-42FC-8CF6-CEEED335747B}" type="datetimeFigureOut">
               <a:rPr lang="en-IN" smtClean="0"/>
-              <a:t>30-12-2025</a:t>
+              <a:t>01-01-2026</a:t>
             </a:fld>
             <a:endParaRPr lang="en-IN"/>
           </a:p>
@@ -1980,7 +1980,7 @@
           <a:p>
             <a:fld id="{3757B9D6-B1DD-42FC-8CF6-CEEED335747B}" type="datetimeFigureOut">
               <a:rPr lang="en-IN" smtClean="0"/>
-              <a:t>30-12-2025</a:t>
+              <a:t>01-01-2026</a:t>
             </a:fld>
             <a:endParaRPr lang="en-IN"/>
           </a:p>
@@ -2093,7 +2093,7 @@
           <a:p>
             <a:fld id="{3757B9D6-B1DD-42FC-8CF6-CEEED335747B}" type="datetimeFigureOut">
               <a:rPr lang="en-IN" smtClean="0"/>
-              <a:t>30-12-2025</a:t>
+              <a:t>01-01-2026</a:t>
             </a:fld>
             <a:endParaRPr lang="en-IN"/>
           </a:p>
@@ -2406,7 +2406,7 @@
           <a:p>
             <a:fld id="{3757B9D6-B1DD-42FC-8CF6-CEEED335747B}" type="datetimeFigureOut">
               <a:rPr lang="en-IN" smtClean="0"/>
-              <a:t>30-12-2025</a:t>
+              <a:t>01-01-2026</a:t>
             </a:fld>
             <a:endParaRPr lang="en-IN"/>
           </a:p>
@@ -2695,7 +2695,7 @@
           <a:p>
             <a:fld id="{3757B9D6-B1DD-42FC-8CF6-CEEED335747B}" type="datetimeFigureOut">
               <a:rPr lang="en-IN" smtClean="0"/>
-              <a:t>30-12-2025</a:t>
+              <a:t>01-01-2026</a:t>
             </a:fld>
             <a:endParaRPr lang="en-IN"/>
           </a:p>
@@ -2938,7 +2938,7 @@
           <a:p>
             <a:fld id="{3757B9D6-B1DD-42FC-8CF6-CEEED335747B}" type="datetimeFigureOut">
               <a:rPr lang="en-IN" smtClean="0"/>
-              <a:t>30-12-2025</a:t>
+              <a:t>01-01-2026</a:t>
             </a:fld>
             <a:endParaRPr lang="en-IN"/>
           </a:p>
@@ -7369,7 +7369,7 @@
             <p:ph idx="1"/>
             <p:extLst>
               <p:ext uri="{D42A27DB-BD31-4B8C-83A1-F6EECF244321}">
-                <p14:modId xmlns:p14="http://schemas.microsoft.com/office/powerpoint/2010/main" val="3822894350"/>
+                <p14:modId xmlns:p14="http://schemas.microsoft.com/office/powerpoint/2010/main" val="1739135923"/>
               </p:ext>
             </p:extLst>
           </p:nvPr>
@@ -8640,12 +8640,12 @@
                     <a:p>
                       <a:pPr algn="l" fontAlgn="b"/>
                       <a:r>
-                        <a:rPr lang="en-IN" sz="1400" u="none" strike="noStrike">
-                          <a:effectLst/>
-                        </a:rPr>
-                        <a:t> </a:t>
-                      </a:r>
-                      <a:endParaRPr lang="en-IN" sz="1400" b="0" i="0" u="none" strike="noStrike">
+                        <a:rPr lang="en-IN" sz="1400" u="none" strike="noStrike" dirty="0">
+                          <a:effectLst/>
+                        </a:rPr>
+                        <a:t>             DONE</a:t>
+                      </a:r>
+                      <a:endParaRPr lang="en-IN" sz="1400" b="0" i="0" u="none" strike="noStrike" dirty="0">
                         <a:solidFill>
                           <a:srgbClr val="000000"/>
                         </a:solidFill>
@@ -8795,7 +8795,7 @@
                         <a:rPr lang="en-IN" sz="1400" u="none" strike="noStrike">
                           <a:effectLst/>
                         </a:rPr>
-                        <a:t> </a:t>
+                        <a:t>             </a:t>
                       </a:r>
                       <a:endParaRPr lang="en-IN" sz="1400" b="0" i="0" u="none" strike="noStrike">
                         <a:solidFill>

</xml_diff>

<commit_message>
added backend prctise file
</commit_message>
<xml_diff>
--- a/ROADMAP/roadmap js.pptx
+++ b/ROADMAP/roadmap js.pptx
@@ -269,7 +269,7 @@
           <a:p>
             <a:fld id="{3757B9D6-B1DD-42FC-8CF6-CEEED335747B}" type="datetimeFigureOut">
               <a:rPr lang="en-IN" smtClean="0"/>
-              <a:t>01-01-2026</a:t>
+              <a:t>02-01-2026</a:t>
             </a:fld>
             <a:endParaRPr lang="en-IN"/>
           </a:p>
@@ -469,7 +469,7 @@
           <a:p>
             <a:fld id="{3757B9D6-B1DD-42FC-8CF6-CEEED335747B}" type="datetimeFigureOut">
               <a:rPr lang="en-IN" smtClean="0"/>
-              <a:t>01-01-2026</a:t>
+              <a:t>02-01-2026</a:t>
             </a:fld>
             <a:endParaRPr lang="en-IN"/>
           </a:p>
@@ -679,7 +679,7 @@
           <a:p>
             <a:fld id="{3757B9D6-B1DD-42FC-8CF6-CEEED335747B}" type="datetimeFigureOut">
               <a:rPr lang="en-IN" smtClean="0"/>
-              <a:t>01-01-2026</a:t>
+              <a:t>02-01-2026</a:t>
             </a:fld>
             <a:endParaRPr lang="en-IN"/>
           </a:p>
@@ -879,7 +879,7 @@
           <a:p>
             <a:fld id="{3757B9D6-B1DD-42FC-8CF6-CEEED335747B}" type="datetimeFigureOut">
               <a:rPr lang="en-IN" smtClean="0"/>
-              <a:t>01-01-2026</a:t>
+              <a:t>02-01-2026</a:t>
             </a:fld>
             <a:endParaRPr lang="en-IN"/>
           </a:p>
@@ -1155,7 +1155,7 @@
           <a:p>
             <a:fld id="{3757B9D6-B1DD-42FC-8CF6-CEEED335747B}" type="datetimeFigureOut">
               <a:rPr lang="en-IN" smtClean="0"/>
-              <a:t>01-01-2026</a:t>
+              <a:t>02-01-2026</a:t>
             </a:fld>
             <a:endParaRPr lang="en-IN"/>
           </a:p>
@@ -1423,7 +1423,7 @@
           <a:p>
             <a:fld id="{3757B9D6-B1DD-42FC-8CF6-CEEED335747B}" type="datetimeFigureOut">
               <a:rPr lang="en-IN" smtClean="0"/>
-              <a:t>01-01-2026</a:t>
+              <a:t>02-01-2026</a:t>
             </a:fld>
             <a:endParaRPr lang="en-IN"/>
           </a:p>
@@ -1838,7 +1838,7 @@
           <a:p>
             <a:fld id="{3757B9D6-B1DD-42FC-8CF6-CEEED335747B}" type="datetimeFigureOut">
               <a:rPr lang="en-IN" smtClean="0"/>
-              <a:t>01-01-2026</a:t>
+              <a:t>02-01-2026</a:t>
             </a:fld>
             <a:endParaRPr lang="en-IN"/>
           </a:p>
@@ -1980,7 +1980,7 @@
           <a:p>
             <a:fld id="{3757B9D6-B1DD-42FC-8CF6-CEEED335747B}" type="datetimeFigureOut">
               <a:rPr lang="en-IN" smtClean="0"/>
-              <a:t>01-01-2026</a:t>
+              <a:t>02-01-2026</a:t>
             </a:fld>
             <a:endParaRPr lang="en-IN"/>
           </a:p>
@@ -2093,7 +2093,7 @@
           <a:p>
             <a:fld id="{3757B9D6-B1DD-42FC-8CF6-CEEED335747B}" type="datetimeFigureOut">
               <a:rPr lang="en-IN" smtClean="0"/>
-              <a:t>01-01-2026</a:t>
+              <a:t>02-01-2026</a:t>
             </a:fld>
             <a:endParaRPr lang="en-IN"/>
           </a:p>
@@ -2406,7 +2406,7 @@
           <a:p>
             <a:fld id="{3757B9D6-B1DD-42FC-8CF6-CEEED335747B}" type="datetimeFigureOut">
               <a:rPr lang="en-IN" smtClean="0"/>
-              <a:t>01-01-2026</a:t>
+              <a:t>02-01-2026</a:t>
             </a:fld>
             <a:endParaRPr lang="en-IN"/>
           </a:p>
@@ -2695,7 +2695,7 @@
           <a:p>
             <a:fld id="{3757B9D6-B1DD-42FC-8CF6-CEEED335747B}" type="datetimeFigureOut">
               <a:rPr lang="en-IN" smtClean="0"/>
-              <a:t>01-01-2026</a:t>
+              <a:t>02-01-2026</a:t>
             </a:fld>
             <a:endParaRPr lang="en-IN"/>
           </a:p>
@@ -2938,7 +2938,7 @@
           <a:p>
             <a:fld id="{3757B9D6-B1DD-42FC-8CF6-CEEED335747B}" type="datetimeFigureOut">
               <a:rPr lang="en-IN" smtClean="0"/>
-              <a:t>01-01-2026</a:t>
+              <a:t>02-01-2026</a:t>
             </a:fld>
             <a:endParaRPr lang="en-IN"/>
           </a:p>
@@ -7369,7 +7369,7 @@
             <p:ph idx="1"/>
             <p:extLst>
               <p:ext uri="{D42A27DB-BD31-4B8C-83A1-F6EECF244321}">
-                <p14:modId xmlns:p14="http://schemas.microsoft.com/office/powerpoint/2010/main" val="1739135923"/>
+                <p14:modId xmlns:p14="http://schemas.microsoft.com/office/powerpoint/2010/main" val="3295452415"/>
               </p:ext>
             </p:extLst>
           </p:nvPr>
@@ -8795,7 +8795,7 @@
                         <a:rPr lang="en-IN" sz="1400" u="none" strike="noStrike">
                           <a:effectLst/>
                         </a:rPr>
-                        <a:t>             </a:t>
+                        <a:t>              DONE  </a:t>
                       </a:r>
                       <a:endParaRPr lang="en-IN" sz="1400" b="0" i="0" u="none" strike="noStrike">
                         <a:solidFill>

</xml_diff>